<commit_message>
Antes de uma arrumacao geral
</commit_message>
<xml_diff>
--- a/Images/mundobibtex.pptx
+++ b/Images/mundobibtex.pptx
@@ -5,8 +5,7 @@
     <p:sldMasterId id="2147483648" r:id="rId1"/>
   </p:sldMasterIdLst>
   <p:sldIdLst>
-    <p:sldId id="256" r:id="rId2"/>
-    <p:sldId id="257" r:id="rId3"/>
+    <p:sldId id="257" r:id="rId2"/>
   </p:sldIdLst>
   <p:sldSz cx="12192000" cy="6858000"/>
   <p:notesSz cx="6858000" cy="9144000"/>
@@ -105,6 +104,11 @@
       </a:defRPr>
     </a:lvl9pPr>
   </p:defaultTextStyle>
+  <p:extLst>
+    <p:ext uri="{EFAFB233-063F-42B5-8137-9DF3F51BA10A}">
+      <p15:sldGuideLst xmlns:p15="http://schemas.microsoft.com/office/powerpoint/2012/main"/>
+    </p:ext>
+  </p:extLst>
 </p:presentation>
 </file>
 
@@ -257,7 +261,7 @@
           <a:p>
             <a:fld id="{D5C9EE72-1090-44F8-8033-F738BC12B984}" type="datetimeFigureOut">
               <a:rPr lang="pt-BR" smtClean="0"/>
-              <a:t>12/05/2020</a:t>
+              <a:t>17/05/2020</a:t>
             </a:fld>
             <a:endParaRPr lang="pt-BR"/>
           </a:p>
@@ -457,7 +461,7 @@
           <a:p>
             <a:fld id="{D5C9EE72-1090-44F8-8033-F738BC12B984}" type="datetimeFigureOut">
               <a:rPr lang="pt-BR" smtClean="0"/>
-              <a:t>12/05/2020</a:t>
+              <a:t>17/05/2020</a:t>
             </a:fld>
             <a:endParaRPr lang="pt-BR"/>
           </a:p>
@@ -667,7 +671,7 @@
           <a:p>
             <a:fld id="{D5C9EE72-1090-44F8-8033-F738BC12B984}" type="datetimeFigureOut">
               <a:rPr lang="pt-BR" smtClean="0"/>
-              <a:t>12/05/2020</a:t>
+              <a:t>17/05/2020</a:t>
             </a:fld>
             <a:endParaRPr lang="pt-BR"/>
           </a:p>
@@ -867,7 +871,7 @@
           <a:p>
             <a:fld id="{D5C9EE72-1090-44F8-8033-F738BC12B984}" type="datetimeFigureOut">
               <a:rPr lang="pt-BR" smtClean="0"/>
-              <a:t>12/05/2020</a:t>
+              <a:t>17/05/2020</a:t>
             </a:fld>
             <a:endParaRPr lang="pt-BR"/>
           </a:p>
@@ -1143,7 +1147,7 @@
           <a:p>
             <a:fld id="{D5C9EE72-1090-44F8-8033-F738BC12B984}" type="datetimeFigureOut">
               <a:rPr lang="pt-BR" smtClean="0"/>
-              <a:t>12/05/2020</a:t>
+              <a:t>17/05/2020</a:t>
             </a:fld>
             <a:endParaRPr lang="pt-BR"/>
           </a:p>
@@ -1411,7 +1415,7 @@
           <a:p>
             <a:fld id="{D5C9EE72-1090-44F8-8033-F738BC12B984}" type="datetimeFigureOut">
               <a:rPr lang="pt-BR" smtClean="0"/>
-              <a:t>12/05/2020</a:t>
+              <a:t>17/05/2020</a:t>
             </a:fld>
             <a:endParaRPr lang="pt-BR"/>
           </a:p>
@@ -1826,7 +1830,7 @@
           <a:p>
             <a:fld id="{D5C9EE72-1090-44F8-8033-F738BC12B984}" type="datetimeFigureOut">
               <a:rPr lang="pt-BR" smtClean="0"/>
-              <a:t>12/05/2020</a:t>
+              <a:t>17/05/2020</a:t>
             </a:fld>
             <a:endParaRPr lang="pt-BR"/>
           </a:p>
@@ -1968,7 +1972,7 @@
           <a:p>
             <a:fld id="{D5C9EE72-1090-44F8-8033-F738BC12B984}" type="datetimeFigureOut">
               <a:rPr lang="pt-BR" smtClean="0"/>
-              <a:t>12/05/2020</a:t>
+              <a:t>17/05/2020</a:t>
             </a:fld>
             <a:endParaRPr lang="pt-BR"/>
           </a:p>
@@ -2081,7 +2085,7 @@
           <a:p>
             <a:fld id="{D5C9EE72-1090-44F8-8033-F738BC12B984}" type="datetimeFigureOut">
               <a:rPr lang="pt-BR" smtClean="0"/>
-              <a:t>12/05/2020</a:t>
+              <a:t>17/05/2020</a:t>
             </a:fld>
             <a:endParaRPr lang="pt-BR"/>
           </a:p>
@@ -2394,7 +2398,7 @@
           <a:p>
             <a:fld id="{D5C9EE72-1090-44F8-8033-F738BC12B984}" type="datetimeFigureOut">
               <a:rPr lang="pt-BR" smtClean="0"/>
-              <a:t>12/05/2020</a:t>
+              <a:t>17/05/2020</a:t>
             </a:fld>
             <a:endParaRPr lang="pt-BR"/>
           </a:p>
@@ -2683,7 +2687,7 @@
           <a:p>
             <a:fld id="{D5C9EE72-1090-44F8-8033-F738BC12B984}" type="datetimeFigureOut">
               <a:rPr lang="pt-BR" smtClean="0"/>
-              <a:t>12/05/2020</a:t>
+              <a:t>17/05/2020</a:t>
             </a:fld>
             <a:endParaRPr lang="pt-BR"/>
           </a:p>
@@ -2926,7 +2930,7 @@
           <a:p>
             <a:fld id="{D5C9EE72-1090-44F8-8033-F738BC12B984}" type="datetimeFigureOut">
               <a:rPr lang="pt-BR" smtClean="0"/>
-              <a:t>12/05/2020</a:t>
+              <a:t>17/05/2020</a:t>
             </a:fld>
             <a:endParaRPr lang="pt-BR"/>
           </a:p>
@@ -3343,86 +3347,6 @@
           <a:chExt cx="0" cy="0"/>
         </a:xfrm>
       </p:grpSpPr>
-      <p:sp>
-        <p:nvSpPr>
-          <p:cNvPr id="2" name="Title 1">
-            <a:extLst>
-              <a:ext uri="{FF2B5EF4-FFF2-40B4-BE49-F238E27FC236}">
-                <a16:creationId xmlns:a16="http://schemas.microsoft.com/office/drawing/2014/main" id="{7EEB44BA-0B36-4DA8-BD78-7FDDB076484F}"/>
-              </a:ext>
-            </a:extLst>
-          </p:cNvPr>
-          <p:cNvSpPr>
-            <a:spLocks noGrp="1"/>
-          </p:cNvSpPr>
-          <p:nvPr>
-            <p:ph type="ctrTitle"/>
-          </p:nvPr>
-        </p:nvSpPr>
-        <p:spPr/>
-        <p:txBody>
-          <a:bodyPr/>
-          <a:lstStyle/>
-          <a:p>
-            <a:endParaRPr lang="pt-BR"/>
-          </a:p>
-        </p:txBody>
-      </p:sp>
-      <p:sp>
-        <p:nvSpPr>
-          <p:cNvPr id="3" name="Subtitle 2">
-            <a:extLst>
-              <a:ext uri="{FF2B5EF4-FFF2-40B4-BE49-F238E27FC236}">
-                <a16:creationId xmlns:a16="http://schemas.microsoft.com/office/drawing/2014/main" id="{6A665C99-364B-43D9-B95F-2960BC436202}"/>
-              </a:ext>
-            </a:extLst>
-          </p:cNvPr>
-          <p:cNvSpPr>
-            <a:spLocks noGrp="1"/>
-          </p:cNvSpPr>
-          <p:nvPr>
-            <p:ph type="subTitle" idx="1"/>
-          </p:nvPr>
-        </p:nvSpPr>
-        <p:spPr/>
-        <p:txBody>
-          <a:bodyPr/>
-          <a:lstStyle/>
-          <a:p>
-            <a:endParaRPr lang="pt-BR"/>
-          </a:p>
-        </p:txBody>
-      </p:sp>
-    </p:spTree>
-    <p:extLst>
-      <p:ext uri="{BB962C8B-B14F-4D97-AF65-F5344CB8AC3E}">
-        <p14:creationId xmlns:p14="http://schemas.microsoft.com/office/powerpoint/2010/main" val="772671837"/>
-      </p:ext>
-    </p:extLst>
-  </p:cSld>
-  <p:clrMapOvr>
-    <a:masterClrMapping/>
-  </p:clrMapOvr>
-</p:sld>
-</file>
-
-<file path=ppt/slides/slide2.xml><?xml version="1.0" encoding="utf-8"?>
-<p:sld xmlns:a="http://schemas.openxmlformats.org/drawingml/2006/main" xmlns:r="http://schemas.openxmlformats.org/officeDocument/2006/relationships" xmlns:p="http://schemas.openxmlformats.org/presentationml/2006/main">
-  <p:cSld>
-    <p:spTree>
-      <p:nvGrpSpPr>
-        <p:cNvPr id="1" name=""/>
-        <p:cNvGrpSpPr/>
-        <p:nvPr/>
-      </p:nvGrpSpPr>
-      <p:grpSpPr>
-        <a:xfrm>
-          <a:off x="0" y="0"/>
-          <a:ext cx="0" cy="0"/>
-          <a:chOff x="0" y="0"/>
-          <a:chExt cx="0" cy="0"/>
-        </a:xfrm>
-      </p:grpSpPr>
       <p:grpSp>
         <p:nvGrpSpPr>
           <p:cNvPr id="27" name="Group 26">
@@ -3458,7 +3382,7 @@
           <p:spPr>
             <a:xfrm>
               <a:off x="2891464" y="918937"/>
-              <a:ext cx="4146900" cy="886408"/>
+              <a:ext cx="4097832" cy="886408"/>
             </a:xfrm>
             <a:prstGeom prst="rect">
               <a:avLst/>
@@ -3694,8 +3618,8 @@
           </p:nvSpPr>
           <p:spPr>
             <a:xfrm>
-              <a:off x="7239700" y="918937"/>
-              <a:ext cx="1693951" cy="886408"/>
+              <a:off x="7110484" y="918937"/>
+              <a:ext cx="1823168" cy="886408"/>
             </a:xfrm>
             <a:prstGeom prst="rect">
               <a:avLst/>

</xml_diff>